<commit_message>
Added a few error handling examples
</commit_message>
<xml_diff>
--- a/Types of Statements.pptx
+++ b/Types of Statements.pptx
@@ -104,6 +104,11 @@
       </a:defRPr>
     </a:lvl9pPr>
   </p:defaultTextStyle>
+  <p:extLst>
+    <p:ext uri="{EFAFB233-063F-42B5-8137-9DF3F51BA10A}">
+      <p15:sldGuideLst xmlns:p15="http://schemas.microsoft.com/office/powerpoint/2012/main"/>
+    </p:ext>
+  </p:extLst>
 </p:presentation>
 </file>
 
@@ -254,7 +259,7 @@
           <a:p>
             <a:fld id="{B4B5768B-FF8D-4291-8595-65346DC1A15F}" type="datetimeFigureOut">
               <a:rPr lang="en-US" smtClean="0"/>
-              <a:t>11/5/2018</a:t>
+              <a:t>11/7/2018</a:t>
             </a:fld>
             <a:endParaRPr lang="en-US"/>
           </a:p>
@@ -452,7 +457,7 @@
           <a:p>
             <a:fld id="{B4B5768B-FF8D-4291-8595-65346DC1A15F}" type="datetimeFigureOut">
               <a:rPr lang="en-US" smtClean="0"/>
-              <a:t>11/5/2018</a:t>
+              <a:t>11/7/2018</a:t>
             </a:fld>
             <a:endParaRPr lang="en-US"/>
           </a:p>
@@ -660,7 +665,7 @@
           <a:p>
             <a:fld id="{B4B5768B-FF8D-4291-8595-65346DC1A15F}" type="datetimeFigureOut">
               <a:rPr lang="en-US" smtClean="0"/>
-              <a:t>11/5/2018</a:t>
+              <a:t>11/7/2018</a:t>
             </a:fld>
             <a:endParaRPr lang="en-US"/>
           </a:p>
@@ -858,7 +863,7 @@
           <a:p>
             <a:fld id="{B4B5768B-FF8D-4291-8595-65346DC1A15F}" type="datetimeFigureOut">
               <a:rPr lang="en-US" smtClean="0"/>
-              <a:t>11/5/2018</a:t>
+              <a:t>11/7/2018</a:t>
             </a:fld>
             <a:endParaRPr lang="en-US"/>
           </a:p>
@@ -1133,7 +1138,7 @@
           <a:p>
             <a:fld id="{B4B5768B-FF8D-4291-8595-65346DC1A15F}" type="datetimeFigureOut">
               <a:rPr lang="en-US" smtClean="0"/>
-              <a:t>11/5/2018</a:t>
+              <a:t>11/7/2018</a:t>
             </a:fld>
             <a:endParaRPr lang="en-US"/>
           </a:p>
@@ -1398,7 +1403,7 @@
           <a:p>
             <a:fld id="{B4B5768B-FF8D-4291-8595-65346DC1A15F}" type="datetimeFigureOut">
               <a:rPr lang="en-US" smtClean="0"/>
-              <a:t>11/5/2018</a:t>
+              <a:t>11/7/2018</a:t>
             </a:fld>
             <a:endParaRPr lang="en-US"/>
           </a:p>
@@ -1810,7 +1815,7 @@
           <a:p>
             <a:fld id="{B4B5768B-FF8D-4291-8595-65346DC1A15F}" type="datetimeFigureOut">
               <a:rPr lang="en-US" smtClean="0"/>
-              <a:t>11/5/2018</a:t>
+              <a:t>11/7/2018</a:t>
             </a:fld>
             <a:endParaRPr lang="en-US"/>
           </a:p>
@@ -1951,7 +1956,7 @@
           <a:p>
             <a:fld id="{B4B5768B-FF8D-4291-8595-65346DC1A15F}" type="datetimeFigureOut">
               <a:rPr lang="en-US" smtClean="0"/>
-              <a:t>11/5/2018</a:t>
+              <a:t>11/7/2018</a:t>
             </a:fld>
             <a:endParaRPr lang="en-US"/>
           </a:p>
@@ -2064,7 +2069,7 @@
           <a:p>
             <a:fld id="{B4B5768B-FF8D-4291-8595-65346DC1A15F}" type="datetimeFigureOut">
               <a:rPr lang="en-US" smtClean="0"/>
-              <a:t>11/5/2018</a:t>
+              <a:t>11/7/2018</a:t>
             </a:fld>
             <a:endParaRPr lang="en-US"/>
           </a:p>
@@ -2375,7 +2380,7 @@
           <a:p>
             <a:fld id="{B4B5768B-FF8D-4291-8595-65346DC1A15F}" type="datetimeFigureOut">
               <a:rPr lang="en-US" smtClean="0"/>
-              <a:t>11/5/2018</a:t>
+              <a:t>11/7/2018</a:t>
             </a:fld>
             <a:endParaRPr lang="en-US"/>
           </a:p>
@@ -2663,7 +2668,7 @@
           <a:p>
             <a:fld id="{B4B5768B-FF8D-4291-8595-65346DC1A15F}" type="datetimeFigureOut">
               <a:rPr lang="en-US" smtClean="0"/>
-              <a:t>11/5/2018</a:t>
+              <a:t>11/7/2018</a:t>
             </a:fld>
             <a:endParaRPr lang="en-US"/>
           </a:p>
@@ -2904,7 +2909,7 @@
           <a:p>
             <a:fld id="{B4B5768B-FF8D-4291-8595-65346DC1A15F}" type="datetimeFigureOut">
               <a:rPr lang="en-US" smtClean="0"/>
-              <a:t>11/5/2018</a:t>
+              <a:t>11/7/2018</a:t>
             </a:fld>
             <a:endParaRPr lang="en-US"/>
           </a:p>
@@ -3323,10 +3328,10 @@
       </p:grpSpPr>
       <p:grpSp>
         <p:nvGrpSpPr>
-          <p:cNvPr id="10" name="Group 9">
-            <a:extLst>
-              <a:ext uri="{FF2B5EF4-FFF2-40B4-BE49-F238E27FC236}">
-                <a16:creationId xmlns:a16="http://schemas.microsoft.com/office/drawing/2014/main" id="{67E80666-83D2-423B-AD65-3DD668B9AB57}"/>
+          <p:cNvPr id="2" name="Group 1">
+            <a:extLst>
+              <a:ext uri="{FF2B5EF4-FFF2-40B4-BE49-F238E27FC236}">
+                <a16:creationId xmlns:a16="http://schemas.microsoft.com/office/drawing/2014/main" id="{09BA9855-DB1E-4BFF-B1AB-72A3AF7F468B}"/>
               </a:ext>
             </a:extLst>
           </p:cNvPr>
@@ -3335,10 +3340,10 @@
         </p:nvGrpSpPr>
         <p:grpSpPr>
           <a:xfrm>
-            <a:off x="1346790" y="900222"/>
-            <a:ext cx="8832111" cy="4267201"/>
-            <a:chOff x="1346790" y="900222"/>
-            <a:chExt cx="8832111" cy="4267201"/>
+            <a:off x="223284" y="900222"/>
+            <a:ext cx="11024819" cy="4267201"/>
+            <a:chOff x="223284" y="900222"/>
+            <a:chExt cx="11024819" cy="4267201"/>
           </a:xfrm>
         </p:grpSpPr>
         <p:sp>
@@ -3355,8 +3360,8 @@
           </p:nvSpPr>
           <p:spPr>
             <a:xfrm>
-              <a:off x="1346790" y="900222"/>
-              <a:ext cx="8832111" cy="4267201"/>
+              <a:off x="223284" y="900222"/>
+              <a:ext cx="11024819" cy="4267201"/>
             </a:xfrm>
             <a:prstGeom prst="rect">
               <a:avLst/>
@@ -3401,8 +3406,8 @@
           </p:nvSpPr>
           <p:spPr>
             <a:xfrm>
-              <a:off x="5773281" y="1026041"/>
-              <a:ext cx="2103120" cy="3383280"/>
+              <a:off x="3419933" y="1097280"/>
+              <a:ext cx="1463040" cy="3383280"/>
             </a:xfrm>
             <a:prstGeom prst="rect">
               <a:avLst/>
@@ -3457,8 +3462,8 @@
           </p:nvSpPr>
           <p:spPr>
             <a:xfrm>
-              <a:off x="1474556" y="1026041"/>
-              <a:ext cx="2103120" cy="3383280"/>
+              <a:off x="392938" y="1097280"/>
+              <a:ext cx="1463040" cy="3383280"/>
             </a:xfrm>
             <a:prstGeom prst="rect">
               <a:avLst/>
@@ -3517,8 +3522,8 @@
           </p:nvSpPr>
           <p:spPr>
             <a:xfrm>
-              <a:off x="3629657" y="1026041"/>
-              <a:ext cx="2103120" cy="3383280"/>
+              <a:off x="1896299" y="1097280"/>
+              <a:ext cx="1463040" cy="3383280"/>
             </a:xfrm>
             <a:prstGeom prst="rect">
               <a:avLst/>
@@ -3573,8 +3578,8 @@
           </p:nvSpPr>
           <p:spPr>
             <a:xfrm>
-              <a:off x="4401681" y="4596986"/>
-              <a:ext cx="2743200" cy="382772"/>
+              <a:off x="4279718" y="4596986"/>
+              <a:ext cx="3642556" cy="382772"/>
             </a:xfrm>
             <a:prstGeom prst="rect">
               <a:avLst/>
@@ -3612,8 +3617,8 @@
           </p:nvSpPr>
           <p:spPr>
             <a:xfrm>
-              <a:off x="7945934" y="1026041"/>
-              <a:ext cx="2103120" cy="3383280"/>
+              <a:off x="4955481" y="1097280"/>
+              <a:ext cx="1463040" cy="3383280"/>
             </a:xfrm>
             <a:prstGeom prst="rect">
               <a:avLst/>
@@ -3649,7 +3654,175 @@
               <a:pPr algn="ctr"/>
               <a:r>
                 <a:rPr lang="en-US" i="1" dirty="0"/>
-                <a:t>If, switch, for, while, etc.</a:t>
+                <a:t>If, switch</a:t>
+              </a:r>
+            </a:p>
+          </p:txBody>
+        </p:sp>
+        <p:sp>
+          <p:nvSpPr>
+            <p:cNvPr id="11" name="Rectangle 10">
+              <a:extLst>
+                <a:ext uri="{FF2B5EF4-FFF2-40B4-BE49-F238E27FC236}">
+                  <a16:creationId xmlns:a16="http://schemas.microsoft.com/office/drawing/2014/main" id="{53DCB388-BBBA-46D1-B7DB-0434F3253566}"/>
+                </a:ext>
+              </a:extLst>
+            </p:cNvPr>
+            <p:cNvSpPr/>
+            <p:nvPr/>
+          </p:nvSpPr>
+          <p:spPr>
+            <a:xfrm>
+              <a:off x="6480965" y="1097280"/>
+              <a:ext cx="1463040" cy="3383280"/>
+            </a:xfrm>
+            <a:prstGeom prst="rect">
+              <a:avLst/>
+            </a:prstGeom>
+          </p:spPr>
+          <p:style>
+            <a:lnRef idx="2">
+              <a:schemeClr val="accent2">
+                <a:shade val="50000"/>
+              </a:schemeClr>
+            </a:lnRef>
+            <a:fillRef idx="1">
+              <a:schemeClr val="accent2"/>
+            </a:fillRef>
+            <a:effectRef idx="0">
+              <a:schemeClr val="accent2"/>
+            </a:effectRef>
+            <a:fontRef idx="minor">
+              <a:schemeClr val="lt1"/>
+            </a:fontRef>
+          </p:style>
+          <p:txBody>
+            <a:bodyPr rtlCol="0" anchor="ctr"/>
+            <a:lstStyle/>
+            <a:p>
+              <a:pPr algn="ctr"/>
+              <a:r>
+                <a:rPr lang="en-US" b="1" i="1" dirty="0"/>
+                <a:t>While:</a:t>
+              </a:r>
+            </a:p>
+            <a:p>
+              <a:pPr algn="ctr"/>
+              <a:r>
+                <a:rPr lang="en-US" dirty="0"/>
+                <a:t>while</a:t>
+              </a:r>
+            </a:p>
+          </p:txBody>
+        </p:sp>
+        <p:sp>
+          <p:nvSpPr>
+            <p:cNvPr id="12" name="Rectangle 11">
+              <a:extLst>
+                <a:ext uri="{FF2B5EF4-FFF2-40B4-BE49-F238E27FC236}">
+                  <a16:creationId xmlns:a16="http://schemas.microsoft.com/office/drawing/2014/main" id="{57414802-8813-4166-B3AC-3DFBF9561A3A}"/>
+                </a:ext>
+              </a:extLst>
+            </p:cNvPr>
+            <p:cNvSpPr/>
+            <p:nvPr/>
+          </p:nvSpPr>
+          <p:spPr>
+            <a:xfrm>
+              <a:off x="8015323" y="1097280"/>
+              <a:ext cx="1463040" cy="3383280"/>
+            </a:xfrm>
+            <a:prstGeom prst="rect">
+              <a:avLst/>
+            </a:prstGeom>
+          </p:spPr>
+          <p:style>
+            <a:lnRef idx="2">
+              <a:schemeClr val="accent2">
+                <a:shade val="50000"/>
+              </a:schemeClr>
+            </a:lnRef>
+            <a:fillRef idx="1">
+              <a:schemeClr val="accent2"/>
+            </a:fillRef>
+            <a:effectRef idx="0">
+              <a:schemeClr val="accent2"/>
+            </a:effectRef>
+            <a:fontRef idx="minor">
+              <a:schemeClr val="lt1"/>
+            </a:fontRef>
+          </p:style>
+          <p:txBody>
+            <a:bodyPr rtlCol="0" anchor="ctr"/>
+            <a:lstStyle/>
+            <a:p>
+              <a:pPr algn="ctr"/>
+              <a:r>
+                <a:rPr lang="en-US" b="1" dirty="0"/>
+                <a:t>Block/compound:</a:t>
+              </a:r>
+            </a:p>
+            <a:p>
+              <a:pPr algn="ctr"/>
+              <a:r>
+                <a:rPr lang="en-US" i="1" dirty="0"/>
+                <a:t>Multiple statements joined together with curly braces</a:t>
+              </a:r>
+            </a:p>
+          </p:txBody>
+        </p:sp>
+        <p:sp>
+          <p:nvSpPr>
+            <p:cNvPr id="13" name="Rectangle 12">
+              <a:extLst>
+                <a:ext uri="{FF2B5EF4-FFF2-40B4-BE49-F238E27FC236}">
+                  <a16:creationId xmlns:a16="http://schemas.microsoft.com/office/drawing/2014/main" id="{4456D231-AF1A-4977-B943-5C96091FF834}"/>
+                </a:ext>
+              </a:extLst>
+            </p:cNvPr>
+            <p:cNvSpPr/>
+            <p:nvPr/>
+          </p:nvSpPr>
+          <p:spPr>
+            <a:xfrm>
+              <a:off x="9564181" y="1097280"/>
+              <a:ext cx="1463040" cy="3383280"/>
+            </a:xfrm>
+            <a:prstGeom prst="rect">
+              <a:avLst/>
+            </a:prstGeom>
+          </p:spPr>
+          <p:style>
+            <a:lnRef idx="2">
+              <a:schemeClr val="accent2">
+                <a:shade val="50000"/>
+              </a:schemeClr>
+            </a:lnRef>
+            <a:fillRef idx="1">
+              <a:schemeClr val="accent2"/>
+            </a:fillRef>
+            <a:effectRef idx="0">
+              <a:schemeClr val="accent2"/>
+            </a:effectRef>
+            <a:fontRef idx="minor">
+              <a:schemeClr val="lt1"/>
+            </a:fontRef>
+          </p:style>
+          <p:txBody>
+            <a:bodyPr rtlCol="0" anchor="ctr"/>
+            <a:lstStyle/>
+            <a:p>
+              <a:pPr algn="ctr"/>
+              <a:r>
+                <a:rPr lang="en-US" b="1" dirty="0"/>
+                <a:t>For:</a:t>
+              </a:r>
+            </a:p>
+            <a:p>
+              <a:pPr algn="ctr"/>
+              <a:r>
+                <a:rPr lang="en-US" i="1" dirty="0"/>
+                <a:t>for</a:t>
               </a:r>
             </a:p>
           </p:txBody>

</xml_diff>

<commit_message>
imrpoved the statement venn diagram
</commit_message>
<xml_diff>
--- a/Types of Statements.pptx
+++ b/Types of Statements.pptx
@@ -259,7 +259,7 @@
           <a:p>
             <a:fld id="{B4B5768B-FF8D-4291-8595-65346DC1A15F}" type="datetimeFigureOut">
               <a:rPr lang="en-US" smtClean="0"/>
-              <a:t>11/7/2018</a:t>
+              <a:t>11/23/2018</a:t>
             </a:fld>
             <a:endParaRPr lang="en-US"/>
           </a:p>
@@ -457,7 +457,7 @@
           <a:p>
             <a:fld id="{B4B5768B-FF8D-4291-8595-65346DC1A15F}" type="datetimeFigureOut">
               <a:rPr lang="en-US" smtClean="0"/>
-              <a:t>11/7/2018</a:t>
+              <a:t>11/23/2018</a:t>
             </a:fld>
             <a:endParaRPr lang="en-US"/>
           </a:p>
@@ -665,7 +665,7 @@
           <a:p>
             <a:fld id="{B4B5768B-FF8D-4291-8595-65346DC1A15F}" type="datetimeFigureOut">
               <a:rPr lang="en-US" smtClean="0"/>
-              <a:t>11/7/2018</a:t>
+              <a:t>11/23/2018</a:t>
             </a:fld>
             <a:endParaRPr lang="en-US"/>
           </a:p>
@@ -863,7 +863,7 @@
           <a:p>
             <a:fld id="{B4B5768B-FF8D-4291-8595-65346DC1A15F}" type="datetimeFigureOut">
               <a:rPr lang="en-US" smtClean="0"/>
-              <a:t>11/7/2018</a:t>
+              <a:t>11/23/2018</a:t>
             </a:fld>
             <a:endParaRPr lang="en-US"/>
           </a:p>
@@ -1138,7 +1138,7 @@
           <a:p>
             <a:fld id="{B4B5768B-FF8D-4291-8595-65346DC1A15F}" type="datetimeFigureOut">
               <a:rPr lang="en-US" smtClean="0"/>
-              <a:t>11/7/2018</a:t>
+              <a:t>11/23/2018</a:t>
             </a:fld>
             <a:endParaRPr lang="en-US"/>
           </a:p>
@@ -1403,7 +1403,7 @@
           <a:p>
             <a:fld id="{B4B5768B-FF8D-4291-8595-65346DC1A15F}" type="datetimeFigureOut">
               <a:rPr lang="en-US" smtClean="0"/>
-              <a:t>11/7/2018</a:t>
+              <a:t>11/23/2018</a:t>
             </a:fld>
             <a:endParaRPr lang="en-US"/>
           </a:p>
@@ -1815,7 +1815,7 @@
           <a:p>
             <a:fld id="{B4B5768B-FF8D-4291-8595-65346DC1A15F}" type="datetimeFigureOut">
               <a:rPr lang="en-US" smtClean="0"/>
-              <a:t>11/7/2018</a:t>
+              <a:t>11/23/2018</a:t>
             </a:fld>
             <a:endParaRPr lang="en-US"/>
           </a:p>
@@ -1956,7 +1956,7 @@
           <a:p>
             <a:fld id="{B4B5768B-FF8D-4291-8595-65346DC1A15F}" type="datetimeFigureOut">
               <a:rPr lang="en-US" smtClean="0"/>
-              <a:t>11/7/2018</a:t>
+              <a:t>11/23/2018</a:t>
             </a:fld>
             <a:endParaRPr lang="en-US"/>
           </a:p>
@@ -2069,7 +2069,7 @@
           <a:p>
             <a:fld id="{B4B5768B-FF8D-4291-8595-65346DC1A15F}" type="datetimeFigureOut">
               <a:rPr lang="en-US" smtClean="0"/>
-              <a:t>11/7/2018</a:t>
+              <a:t>11/23/2018</a:t>
             </a:fld>
             <a:endParaRPr lang="en-US"/>
           </a:p>
@@ -2380,7 +2380,7 @@
           <a:p>
             <a:fld id="{B4B5768B-FF8D-4291-8595-65346DC1A15F}" type="datetimeFigureOut">
               <a:rPr lang="en-US" smtClean="0"/>
-              <a:t>11/7/2018</a:t>
+              <a:t>11/23/2018</a:t>
             </a:fld>
             <a:endParaRPr lang="en-US"/>
           </a:p>
@@ -2668,7 +2668,7 @@
           <a:p>
             <a:fld id="{B4B5768B-FF8D-4291-8595-65346DC1A15F}" type="datetimeFigureOut">
               <a:rPr lang="en-US" smtClean="0"/>
-              <a:t>11/7/2018</a:t>
+              <a:t>11/23/2018</a:t>
             </a:fld>
             <a:endParaRPr lang="en-US"/>
           </a:p>
@@ -2909,7 +2909,7 @@
           <a:p>
             <a:fld id="{B4B5768B-FF8D-4291-8595-65346DC1A15F}" type="datetimeFigureOut">
               <a:rPr lang="en-US" smtClean="0"/>
-              <a:t>11/7/2018</a:t>
+              <a:t>11/23/2018</a:t>
             </a:fld>
             <a:endParaRPr lang="en-US"/>
           </a:p>
@@ -3328,10 +3328,10 @@
       </p:grpSpPr>
       <p:grpSp>
         <p:nvGrpSpPr>
-          <p:cNvPr id="2" name="Group 1">
-            <a:extLst>
-              <a:ext uri="{FF2B5EF4-FFF2-40B4-BE49-F238E27FC236}">
-                <a16:creationId xmlns:a16="http://schemas.microsoft.com/office/drawing/2014/main" id="{09BA9855-DB1E-4BFF-B1AB-72A3AF7F468B}"/>
+          <p:cNvPr id="3" name="Group 2">
+            <a:extLst>
+              <a:ext uri="{FF2B5EF4-FFF2-40B4-BE49-F238E27FC236}">
+                <a16:creationId xmlns:a16="http://schemas.microsoft.com/office/drawing/2014/main" id="{85C3F4FE-EC0D-49F6-BD8D-148817CBA50D}"/>
               </a:ext>
             </a:extLst>
           </p:cNvPr>
@@ -3340,10 +3340,10 @@
         </p:nvGrpSpPr>
         <p:grpSpPr>
           <a:xfrm>
-            <a:off x="223284" y="900222"/>
-            <a:ext cx="11024819" cy="4267201"/>
-            <a:chOff x="223284" y="900222"/>
-            <a:chExt cx="11024819" cy="4267201"/>
+            <a:off x="1169376" y="891430"/>
+            <a:ext cx="10594731" cy="4267201"/>
+            <a:chOff x="1169376" y="891430"/>
+            <a:chExt cx="10594731" cy="4267201"/>
           </a:xfrm>
         </p:grpSpPr>
         <p:sp>
@@ -3360,8 +3360,8 @@
           </p:nvSpPr>
           <p:spPr>
             <a:xfrm>
-              <a:off x="223284" y="900222"/>
-              <a:ext cx="11024819" cy="4267201"/>
+              <a:off x="1169376" y="891430"/>
+              <a:ext cx="10594731" cy="4267201"/>
             </a:xfrm>
             <a:prstGeom prst="rect">
               <a:avLst/>
@@ -3406,8 +3406,8 @@
           </p:nvSpPr>
           <p:spPr>
             <a:xfrm>
-              <a:off x="3419933" y="1097280"/>
-              <a:ext cx="1463040" cy="3383280"/>
+              <a:off x="4782773" y="1333390"/>
+              <a:ext cx="1645920" cy="3383280"/>
             </a:xfrm>
             <a:prstGeom prst="rect">
               <a:avLst/>
@@ -3462,8 +3462,8 @@
           </p:nvSpPr>
           <p:spPr>
             <a:xfrm>
-              <a:off x="392938" y="1097280"/>
-              <a:ext cx="1463040" cy="3383280"/>
+              <a:off x="1346047" y="1333390"/>
+              <a:ext cx="1645920" cy="3383280"/>
             </a:xfrm>
             <a:prstGeom prst="rect">
               <a:avLst/>
@@ -3522,8 +3522,8 @@
           </p:nvSpPr>
           <p:spPr>
             <a:xfrm>
-              <a:off x="1896299" y="1097280"/>
-              <a:ext cx="1463040" cy="3383280"/>
+              <a:off x="3071327" y="1333390"/>
+              <a:ext cx="1645920" cy="3383280"/>
             </a:xfrm>
             <a:prstGeom prst="rect">
               <a:avLst/>
@@ -3578,7 +3578,7 @@
           </p:nvSpPr>
           <p:spPr>
             <a:xfrm>
-              <a:off x="4279718" y="4596986"/>
+              <a:off x="4860010" y="4775858"/>
               <a:ext cx="3642556" cy="382772"/>
             </a:xfrm>
             <a:prstGeom prst="rect">
@@ -3617,8 +3617,8 @@
           </p:nvSpPr>
           <p:spPr>
             <a:xfrm>
-              <a:off x="4955481" y="1097280"/>
-              <a:ext cx="1463040" cy="3383280"/>
+              <a:off x="6494219" y="1333390"/>
+              <a:ext cx="1645920" cy="3383280"/>
             </a:xfrm>
             <a:prstGeom prst="rect">
               <a:avLst/>
@@ -3654,7 +3654,7 @@
               <a:pPr algn="ctr"/>
               <a:r>
                 <a:rPr lang="en-US" i="1" dirty="0"/>
-                <a:t>If, switch</a:t>
+                <a:t>If, else, switch</a:t>
               </a:r>
             </a:p>
           </p:txBody>
@@ -3673,8 +3673,8 @@
           </p:nvSpPr>
           <p:spPr>
             <a:xfrm>
-              <a:off x="6480965" y="1097280"/>
-              <a:ext cx="1463040" cy="3383280"/>
+              <a:off x="8219498" y="1333390"/>
+              <a:ext cx="1645920" cy="3383280"/>
             </a:xfrm>
             <a:prstGeom prst="rect">
               <a:avLst/>
@@ -3703,14 +3703,28 @@
               <a:pPr algn="ctr"/>
               <a:r>
                 <a:rPr lang="en-US" b="1" i="1" dirty="0"/>
-                <a:t>While:</a:t>
+                <a:t>Iteration:</a:t>
               </a:r>
             </a:p>
             <a:p>
               <a:pPr algn="ctr"/>
               <a:r>
                 <a:rPr lang="en-US" dirty="0"/>
-                <a:t>while</a:t>
+                <a:t>While,</a:t>
+              </a:r>
+            </a:p>
+            <a:p>
+              <a:pPr algn="ctr"/>
+              <a:r>
+                <a:rPr lang="en-US" dirty="0"/>
+                <a:t>do,</a:t>
+              </a:r>
+            </a:p>
+            <a:p>
+              <a:pPr algn="ctr"/>
+              <a:r>
+                <a:rPr lang="en-US" dirty="0"/>
+                <a:t>for</a:t>
               </a:r>
             </a:p>
           </p:txBody>
@@ -3729,8 +3743,8 @@
           </p:nvSpPr>
           <p:spPr>
             <a:xfrm>
-              <a:off x="8015323" y="1097280"/>
-              <a:ext cx="1463040" cy="3383280"/>
+              <a:off x="9944778" y="1333390"/>
+              <a:ext cx="1645920" cy="3383280"/>
             </a:xfrm>
             <a:prstGeom prst="rect">
               <a:avLst/>
@@ -3767,62 +3781,6 @@
               <a:r>
                 <a:rPr lang="en-US" i="1" dirty="0"/>
                 <a:t>Multiple statements joined together with curly braces</a:t>
-              </a:r>
-            </a:p>
-          </p:txBody>
-        </p:sp>
-        <p:sp>
-          <p:nvSpPr>
-            <p:cNvPr id="13" name="Rectangle 12">
-              <a:extLst>
-                <a:ext uri="{FF2B5EF4-FFF2-40B4-BE49-F238E27FC236}">
-                  <a16:creationId xmlns:a16="http://schemas.microsoft.com/office/drawing/2014/main" id="{4456D231-AF1A-4977-B943-5C96091FF834}"/>
-                </a:ext>
-              </a:extLst>
-            </p:cNvPr>
-            <p:cNvSpPr/>
-            <p:nvPr/>
-          </p:nvSpPr>
-          <p:spPr>
-            <a:xfrm>
-              <a:off x="9564181" y="1097280"/>
-              <a:ext cx="1463040" cy="3383280"/>
-            </a:xfrm>
-            <a:prstGeom prst="rect">
-              <a:avLst/>
-            </a:prstGeom>
-          </p:spPr>
-          <p:style>
-            <a:lnRef idx="2">
-              <a:schemeClr val="accent2">
-                <a:shade val="50000"/>
-              </a:schemeClr>
-            </a:lnRef>
-            <a:fillRef idx="1">
-              <a:schemeClr val="accent2"/>
-            </a:fillRef>
-            <a:effectRef idx="0">
-              <a:schemeClr val="accent2"/>
-            </a:effectRef>
-            <a:fontRef idx="minor">
-              <a:schemeClr val="lt1"/>
-            </a:fontRef>
-          </p:style>
-          <p:txBody>
-            <a:bodyPr rtlCol="0" anchor="ctr"/>
-            <a:lstStyle/>
-            <a:p>
-              <a:pPr algn="ctr"/>
-              <a:r>
-                <a:rPr lang="en-US" b="1" dirty="0"/>
-                <a:t>For:</a:t>
-              </a:r>
-            </a:p>
-            <a:p>
-              <a:pPr algn="ctr"/>
-              <a:r>
-                <a:rPr lang="en-US" i="1" dirty="0"/>
-                <a:t>for</a:t>
               </a:r>
             </a:p>
           </p:txBody>

</xml_diff>